<commit_message>
Update Gait Monitoring and Analysis for Parkinson's Disease Patients.pptx
</commit_message>
<xml_diff>
--- a/submissions/ISYF/Gait Monitoring and Analysis for Parkinson's Disease Patients.pptx
+++ b/submissions/ISYF/Gait Monitoring and Analysis for Parkinson's Disease Patients.pptx
@@ -321,7 +321,7 @@
       </p15:notesGuideLst>
     </p:ext>
     <p:ext uri="http://customooxmlschemas.google.com/">
-      <go:slidesCustomData xmlns:go="http://customooxmlschemas.google.com/" xmlns:ahyp="http://schemas.microsoft.com/office/drawing/2018/hyperlinkcolor" xmlns:p15="http://schemas.microsoft.com/office/powerpoint/2012/main" xmlns:p14="http://schemas.microsoft.com/office/powerpoint/2010/main" xmlns:com="http://schemas.openxmlformats.org/drawingml/2006/compatibility" xmlns:pvml="urn:schemas-microsoft-com:office:powerpoint" xmlns:v="urn:schemas-microsoft-com:vml" xmlns:o="urn:schemas-microsoft-com:office:office" xmlns:dgm="http://schemas.openxmlformats.org/drawingml/2006/diagram" xmlns:c="http://schemas.openxmlformats.org/drawingml/2006/chart" xmlns:mv="urn:schemas-microsoft-com:mac:vml" xmlns:mc="http://schemas.openxmlformats.org/markup-compatibility/2006" xmlns="" r:id="rId20" roundtripDataSignature="AMtx7mgix6jR15yRaeFiDYyy27Z2Ja4Ibg=="/>
+      <go:slidesCustomData xmlns="" xmlns:mc="http://schemas.openxmlformats.org/markup-compatibility/2006" xmlns:mv="urn:schemas-microsoft-com:mac:vml" xmlns:c="http://schemas.openxmlformats.org/drawingml/2006/chart" xmlns:dgm="http://schemas.openxmlformats.org/drawingml/2006/diagram" xmlns:o="urn:schemas-microsoft-com:office:office" xmlns:v="urn:schemas-microsoft-com:vml" xmlns:pvml="urn:schemas-microsoft-com:office:powerpoint" xmlns:com="http://schemas.openxmlformats.org/drawingml/2006/compatibility" xmlns:p14="http://schemas.microsoft.com/office/powerpoint/2010/main" xmlns:p15="http://schemas.microsoft.com/office/powerpoint/2012/main" xmlns:ahyp="http://schemas.microsoft.com/office/drawing/2018/hyperlinkcolor" xmlns:go="http://customooxmlschemas.google.com/" r:id="rId20" roundtripDataSignature="AMtx7mgix6jR15yRaeFiDYyy27Z2Ja4Ibg=="/>
     </p:ext>
   </p:extLst>
 </p:presentation>
@@ -21610,7 +21610,7 @@
               <a:rPr lang="en-US">
                 <a:extLst>
                   <a:ext uri="http://customooxmlschemas.google.com/">
-                    <go:slidesCustomData xmlns:go="http://customooxmlschemas.google.com/" xmlns:ahyp="http://schemas.microsoft.com/office/drawing/2018/hyperlinkcolor" xmlns:p15="http://schemas.microsoft.com/office/powerpoint/2012/main" xmlns:p14="http://schemas.microsoft.com/office/powerpoint/2010/main" xmlns:com="http://schemas.openxmlformats.org/drawingml/2006/compatibility" xmlns:pvml="urn:schemas-microsoft-com:office:powerpoint" xmlns:v="urn:schemas-microsoft-com:vml" xmlns:o="urn:schemas-microsoft-com:office:office" xmlns:dgm="http://schemas.openxmlformats.org/drawingml/2006/diagram" xmlns:c="http://schemas.openxmlformats.org/drawingml/2006/chart" xmlns:mv="urn:schemas-microsoft-com:mac:vml" xmlns:mc="http://schemas.openxmlformats.org/markup-compatibility/2006" xmlns="" textRoundtripDataId="0"/>
+                    <go:slidesCustomData xmlns="" xmlns:mc="http://schemas.openxmlformats.org/markup-compatibility/2006" xmlns:mv="urn:schemas-microsoft-com:mac:vml" xmlns:c="http://schemas.openxmlformats.org/drawingml/2006/chart" xmlns:dgm="http://schemas.openxmlformats.org/drawingml/2006/diagram" xmlns:o="urn:schemas-microsoft-com:office:office" xmlns:v="urn:schemas-microsoft-com:vml" xmlns:pvml="urn:schemas-microsoft-com:office:powerpoint" xmlns:com="http://schemas.openxmlformats.org/drawingml/2006/compatibility" xmlns:p14="http://schemas.microsoft.com/office/powerpoint/2010/main" xmlns:p15="http://schemas.microsoft.com/office/powerpoint/2012/main" xmlns:ahyp="http://schemas.microsoft.com/office/drawing/2018/hyperlinkcolor" xmlns:go="http://customooxmlschemas.google.com/" textRoundtripDataId="0"/>
                   </a:ext>
                 </a:extLst>
               </a:rPr>
@@ -32064,7 +32064,7 @@
                           <a:sym typeface="Trebuchet MS"/>
                           <a:extLst>
                             <a:ext uri="http://customooxmlschemas.google.com/">
-                              <go:slidesCustomData xmlns:go="http://customooxmlschemas.google.com/" xmlns:ahyp="http://schemas.microsoft.com/office/drawing/2018/hyperlinkcolor" xmlns:p15="http://schemas.microsoft.com/office/powerpoint/2012/main" xmlns:p14="http://schemas.microsoft.com/office/powerpoint/2010/main" xmlns:com="http://schemas.openxmlformats.org/drawingml/2006/compatibility" xmlns:pvml="urn:schemas-microsoft-com:office:powerpoint" xmlns:v="urn:schemas-microsoft-com:vml" xmlns:o="urn:schemas-microsoft-com:office:office" xmlns:dgm="http://schemas.openxmlformats.org/drawingml/2006/diagram" xmlns:c="http://schemas.openxmlformats.org/drawingml/2006/chart" xmlns:mv="urn:schemas-microsoft-com:mac:vml" xmlns:mc="http://schemas.openxmlformats.org/markup-compatibility/2006" xmlns="" textRoundtripDataId="1"/>
+                              <go:slidesCustomData xmlns="" xmlns:mc="http://schemas.openxmlformats.org/markup-compatibility/2006" xmlns:mv="urn:schemas-microsoft-com:mac:vml" xmlns:c="http://schemas.openxmlformats.org/drawingml/2006/chart" xmlns:dgm="http://schemas.openxmlformats.org/drawingml/2006/diagram" xmlns:o="urn:schemas-microsoft-com:office:office" xmlns:v="urn:schemas-microsoft-com:vml" xmlns:pvml="urn:schemas-microsoft-com:office:powerpoint" xmlns:com="http://schemas.openxmlformats.org/drawingml/2006/compatibility" xmlns:p14="http://schemas.microsoft.com/office/powerpoint/2010/main" xmlns:p15="http://schemas.microsoft.com/office/powerpoint/2012/main" xmlns:ahyp="http://schemas.microsoft.com/office/drawing/2018/hyperlinkcolor" xmlns:go="http://customooxmlschemas.google.com/" textRoundtripDataId="1"/>
                             </a:ext>
                           </a:extLst>
                         </a:rPr>

</xml_diff>